<commit_message>
Update readme and powerpoint
</commit_message>
<xml_diff>
--- a/docs/Sprint_2.pptx
+++ b/docs/Sprint_2.pptx
@@ -283,7 +283,7 @@
           <a:p>
             <a:fld id="{3E31D308-CABC-4F6E-8D26-4E33C6E638F7}" type="datetimeFigureOut">
               <a:rPr lang="en-NL" smtClean="0"/>
-              <a:t>11/10/2023</a:t>
+              <a:t>06/11/2023</a:t>
             </a:fld>
             <a:endParaRPr lang="en-NL"/>
           </a:p>
@@ -511,7 +511,7 @@
           <a:p>
             <a:fld id="{3E31D308-CABC-4F6E-8D26-4E33C6E638F7}" type="datetimeFigureOut">
               <a:rPr lang="en-NL" smtClean="0"/>
-              <a:t>11/10/2023</a:t>
+              <a:t>06/11/2023</a:t>
             </a:fld>
             <a:endParaRPr lang="en-NL"/>
           </a:p>
@@ -691,7 +691,7 @@
           <a:p>
             <a:fld id="{3E31D308-CABC-4F6E-8D26-4E33C6E638F7}" type="datetimeFigureOut">
               <a:rPr lang="en-NL" smtClean="0"/>
-              <a:t>11/10/2023</a:t>
+              <a:t>06/11/2023</a:t>
             </a:fld>
             <a:endParaRPr lang="en-NL"/>
           </a:p>
@@ -861,7 +861,7 @@
           <a:p>
             <a:fld id="{3E31D308-CABC-4F6E-8D26-4E33C6E638F7}" type="datetimeFigureOut">
               <a:rPr lang="en-NL" smtClean="0"/>
-              <a:t>11/10/2023</a:t>
+              <a:t>06/11/2023</a:t>
             </a:fld>
             <a:endParaRPr lang="en-NL"/>
           </a:p>
@@ -1115,7 +1115,7 @@
           <a:p>
             <a:fld id="{3E31D308-CABC-4F6E-8D26-4E33C6E638F7}" type="datetimeFigureOut">
               <a:rPr lang="en-NL" smtClean="0"/>
-              <a:t>11/10/2023</a:t>
+              <a:t>06/11/2023</a:t>
             </a:fld>
             <a:endParaRPr lang="en-NL"/>
           </a:p>
@@ -1441,7 +1441,7 @@
           <a:p>
             <a:fld id="{3E31D308-CABC-4F6E-8D26-4E33C6E638F7}" type="datetimeFigureOut">
               <a:rPr lang="en-NL" smtClean="0"/>
-              <a:t>11/10/2023</a:t>
+              <a:t>06/11/2023</a:t>
             </a:fld>
             <a:endParaRPr lang="en-NL"/>
           </a:p>
@@ -1892,7 +1892,7 @@
           <a:p>
             <a:fld id="{3E31D308-CABC-4F6E-8D26-4E33C6E638F7}" type="datetimeFigureOut">
               <a:rPr lang="en-NL" smtClean="0"/>
-              <a:t>11/10/2023</a:t>
+              <a:t>06/11/2023</a:t>
             </a:fld>
             <a:endParaRPr lang="en-NL"/>
           </a:p>
@@ -2010,7 +2010,7 @@
           <a:p>
             <a:fld id="{3E31D308-CABC-4F6E-8D26-4E33C6E638F7}" type="datetimeFigureOut">
               <a:rPr lang="en-NL" smtClean="0"/>
-              <a:t>11/10/2023</a:t>
+              <a:t>06/11/2023</a:t>
             </a:fld>
             <a:endParaRPr lang="en-NL"/>
           </a:p>
@@ -2105,7 +2105,7 @@
           <a:p>
             <a:fld id="{3E31D308-CABC-4F6E-8D26-4E33C6E638F7}" type="datetimeFigureOut">
               <a:rPr lang="en-NL" smtClean="0"/>
-              <a:t>11/10/2023</a:t>
+              <a:t>06/11/2023</a:t>
             </a:fld>
             <a:endParaRPr lang="en-NL"/>
           </a:p>
@@ -2392,7 +2392,7 @@
           <a:p>
             <a:fld id="{3E31D308-CABC-4F6E-8D26-4E33C6E638F7}" type="datetimeFigureOut">
               <a:rPr lang="en-NL" smtClean="0"/>
-              <a:t>11/10/2023</a:t>
+              <a:t>06/11/2023</a:t>
             </a:fld>
             <a:endParaRPr lang="en-NL"/>
           </a:p>
@@ -2714,7 +2714,7 @@
           <a:p>
             <a:fld id="{3E31D308-CABC-4F6E-8D26-4E33C6E638F7}" type="datetimeFigureOut">
               <a:rPr lang="en-NL" smtClean="0"/>
-              <a:t>11/10/2023</a:t>
+              <a:t>06/11/2023</a:t>
             </a:fld>
             <a:endParaRPr lang="en-NL"/>
           </a:p>
@@ -2968,7 +2968,7 @@
           <a:p>
             <a:fld id="{3E31D308-CABC-4F6E-8D26-4E33C6E638F7}" type="datetimeFigureOut">
               <a:rPr lang="en-NL" smtClean="0"/>
-              <a:t>11/10/2023</a:t>
+              <a:t>06/11/2023</a:t>
             </a:fld>
             <a:endParaRPr lang="en-NL"/>
           </a:p>
@@ -3479,7 +3479,7 @@
           <a:p>
             <a:r>
               <a:rPr lang="en-GB" dirty="0"/>
-              <a:t>Sprint 1 delivery</a:t>
+              <a:t>Sprint 2 delivery</a:t>
             </a:r>
             <a:endParaRPr lang="en-NL" dirty="0"/>
           </a:p>
@@ -3593,50 +3593,85 @@
             <p:ph idx="1"/>
           </p:nvPr>
         </p:nvSpPr>
-        <p:spPr/>
-        <p:txBody>
-          <a:bodyPr/>
+        <p:spPr>
+          <a:xfrm>
+            <a:off x="1261872" y="1691322"/>
+            <a:ext cx="8595360" cy="4488815"/>
+          </a:xfrm>
+        </p:spPr>
+        <p:txBody>
+          <a:bodyPr>
+            <a:normAutofit lnSpcReduction="10000"/>
+          </a:bodyPr>
           <a:lstStyle/>
           <a:p>
             <a:r>
               <a:rPr lang="en-GB" dirty="0"/>
-              <a:t>Create research plan</a:t>
+              <a:t>Create architecture diagrams</a:t>
             </a:r>
           </a:p>
           <a:p>
             <a:r>
               <a:rPr lang="en-GB" dirty="0"/>
-              <a:t>Initial Architecture research</a:t>
+              <a:t>Substantiate technology choices</a:t>
             </a:r>
           </a:p>
           <a:p>
             <a:r>
               <a:rPr lang="en-GB" dirty="0"/>
-              <a:t>Walking skeleton</a:t>
+              <a:t>Authentication</a:t>
             </a:r>
           </a:p>
           <a:p>
             <a:r>
               <a:rPr lang="en-GB" dirty="0"/>
-              <a:t>More user stories</a:t>
+              <a:t>Create 1 or 2 microservices</a:t>
             </a:r>
           </a:p>
           <a:p>
             <a:r>
               <a:rPr lang="en-GB" dirty="0"/>
-              <a:t>Organize GitHub projects</a:t>
+              <a:t>Functioning service bus / message broker</a:t>
             </a:r>
           </a:p>
           <a:p>
             <a:r>
               <a:rPr lang="en-GB" dirty="0"/>
-              <a:t>Initial reading guide</a:t>
-            </a:r>
+              <a:t>CI/CD pipeline running</a:t>
+            </a:r>
+          </a:p>
+          <a:p>
+            <a:r>
+              <a:rPr lang="en-GB" dirty="0" err="1"/>
+              <a:t>Specflow</a:t>
+            </a:r>
+            <a:endParaRPr lang="en-GB" dirty="0"/>
           </a:p>
           <a:p>
             <a:r>
               <a:rPr lang="en-GB" dirty="0"/>
-              <a:t>Definition of Done</a:t>
+              <a:t>Rewrite all user stories to </a:t>
+            </a:r>
+            <a:r>
+              <a:rPr lang="en-GB" dirty="0" err="1"/>
+              <a:t>Ghurkin</a:t>
+            </a:r>
+            <a:endParaRPr lang="en-GB" dirty="0"/>
+          </a:p>
+          <a:p>
+            <a:r>
+              <a:rPr lang="en-GB" dirty="0"/>
+              <a:t>Update the reading guide</a:t>
+            </a:r>
+          </a:p>
+          <a:p>
+            <a:r>
+              <a:rPr lang="en-GB" dirty="0" err="1"/>
+              <a:t>Sonarcloud</a:t>
+            </a:r>
+            <a:r>
+              <a:rPr lang="en-GB" dirty="0"/>
+              <a:t> static code analysis</a:t>
             </a:r>
           </a:p>
         </p:txBody>
@@ -3723,32 +3758,63 @@
           <a:p>
             <a:r>
               <a:rPr lang="en-GB" dirty="0"/>
-              <a:t>Create research plan</a:t>
+              <a:t>Create architecture diagrams</a:t>
             </a:r>
           </a:p>
           <a:p>
             <a:r>
               <a:rPr lang="en-GB" dirty="0"/>
-              <a:t>Organize GitHub projects</a:t>
+              <a:t>Substantiate technology choices</a:t>
             </a:r>
           </a:p>
           <a:p>
             <a:r>
               <a:rPr lang="en-GB" dirty="0"/>
-              <a:t>Initial reading guide</a:t>
+              <a:t>Create 1 or 2 microservices</a:t>
             </a:r>
           </a:p>
           <a:p>
             <a:r>
               <a:rPr lang="en-GB" dirty="0"/>
-              <a:t>Definition of Done</a:t>
+              <a:t>Functioning service bus / message broker</a:t>
             </a:r>
           </a:p>
           <a:p>
             <a:r>
               <a:rPr lang="en-GB" dirty="0"/>
-              <a:t>Initial Architecture research</a:t>
-            </a:r>
+              <a:t>CI/CD pipeline running</a:t>
+            </a:r>
+          </a:p>
+          <a:p>
+            <a:r>
+              <a:rPr lang="en-GB" dirty="0"/>
+              <a:t>Rewrite all user stories to </a:t>
+            </a:r>
+            <a:r>
+              <a:rPr lang="en-GB" dirty="0" err="1"/>
+              <a:t>Ghurkin</a:t>
+            </a:r>
+            <a:endParaRPr lang="en-GB" dirty="0"/>
+          </a:p>
+          <a:p>
+            <a:r>
+              <a:rPr lang="en-GB"/>
+              <a:t>Update the reading guide</a:t>
+            </a:r>
+            <a:endParaRPr lang="en-GB" dirty="0"/>
+          </a:p>
+          <a:p>
+            <a:r>
+              <a:rPr lang="en-GB" dirty="0" err="1"/>
+              <a:t>Sonarcloud</a:t>
+            </a:r>
+            <a:r>
+              <a:rPr lang="en-GB" dirty="0"/>
+              <a:t> static code analysis</a:t>
+            </a:r>
+          </a:p>
+          <a:p>
+            <a:endParaRPr lang="en-GB" dirty="0"/>
           </a:p>
         </p:txBody>
       </p:sp>
@@ -3834,40 +3900,39 @@
           <a:p>
             <a:r>
               <a:rPr lang="en-GB" dirty="0"/>
-              <a:t>Outstanding tasks/stories</a:t>
+              <a:t>Outstanding tasks/stories to next sprint</a:t>
             </a:r>
           </a:p>
           <a:p>
             <a:r>
               <a:rPr lang="en-GB" dirty="0"/>
-              <a:t>Refining stories</a:t>
+              <a:t>Start writing tests to confirm user stories</a:t>
             </a:r>
           </a:p>
           <a:p>
             <a:r>
               <a:rPr lang="en-GB" dirty="0"/>
-              <a:t>Walking skeleton</a:t>
+              <a:t>Finish authentication &amp; authorization</a:t>
             </a:r>
           </a:p>
           <a:p>
             <a:r>
               <a:rPr lang="en-GB" dirty="0"/>
-              <a:t>Finalize initial architecture choices</a:t>
-            </a:r>
-          </a:p>
-          <a:p>
+              <a:t>Implement automated </a:t>
+            </a:r>
+            <a:r>
+              <a:rPr lang="en-GB" dirty="0" err="1"/>
+              <a:t>Specflow</a:t>
+            </a:r>
             <a:r>
               <a:rPr lang="en-GB" dirty="0"/>
-              <a:t>Start architecture design sketch (C2)</a:t>
-            </a:r>
-          </a:p>
-          <a:p>
-            <a:r>
-              <a:rPr lang="en-GB" dirty="0"/>
-              <a:t>Start defining in reading guide what comes next to achieve LOs</a:t>
-            </a:r>
-          </a:p>
-          <a:p>
+              <a:t> testing</a:t>
+            </a:r>
+          </a:p>
+          <a:p>
+            <a:pPr marL="0" indent="0">
+              <a:buNone/>
+            </a:pPr>
             <a:endParaRPr lang="en-NL" dirty="0"/>
           </a:p>
         </p:txBody>

</xml_diff>

<commit_message>
Add inter-service communication doc
</commit_message>
<xml_diff>
--- a/docs/Sprint_2.pptx
+++ b/docs/Sprint_2.pptx
@@ -3619,12 +3619,6 @@
           <a:p>
             <a:r>
               <a:rPr lang="en-GB" dirty="0"/>
-              <a:t>Authentication</a:t>
-            </a:r>
-          </a:p>
-          <a:p>
-            <a:r>
-              <a:rPr lang="en-GB" dirty="0"/>
               <a:t>Create 1 or 2 microservices</a:t>
             </a:r>
           </a:p>
@@ -3673,6 +3667,17 @@
               <a:rPr lang="en-GB" dirty="0"/>
               <a:t> static code analysis</a:t>
             </a:r>
+          </a:p>
+          <a:p>
+            <a:r>
+              <a:rPr lang="en-GB" dirty="0"/>
+              <a:t>Orchestrated with </a:t>
+            </a:r>
+            <a:r>
+              <a:rPr lang="en-GB" dirty="0" err="1"/>
+              <a:t>kubernetes</a:t>
+            </a:r>
+            <a:endParaRPr lang="en-GB" dirty="0"/>
           </a:p>
         </p:txBody>
       </p:sp>
@@ -3753,7 +3758,9 @@
         </p:nvSpPr>
         <p:spPr/>
         <p:txBody>
-          <a:bodyPr/>
+          <a:bodyPr>
+            <a:normAutofit fontScale="92500" lnSpcReduction="10000"/>
+          </a:bodyPr>
           <a:lstStyle/>
           <a:p>
             <a:r>
@@ -3766,6 +3773,7 @@
               <a:rPr lang="en-GB" dirty="0"/>
               <a:t>Substantiate technology choices</a:t>
             </a:r>
+            <a:endParaRPr lang="en-GB" strike="sngStrike" dirty="0"/>
           </a:p>
           <a:p>
             <a:r>
@@ -3787,6 +3795,13 @@
           </a:p>
           <a:p>
             <a:r>
+              <a:rPr lang="en-GB" strike="sngStrike" dirty="0" err="1"/>
+              <a:t>Specflow</a:t>
+            </a:r>
+            <a:endParaRPr lang="en-GB" strike="sngStrike" dirty="0"/>
+          </a:p>
+          <a:p>
+            <a:r>
               <a:rPr lang="en-GB" dirty="0"/>
               <a:t>Rewrite all user stories to </a:t>
             </a:r>
@@ -3798,10 +3813,9 @@
           </a:p>
           <a:p>
             <a:r>
-              <a:rPr lang="en-GB"/>
+              <a:rPr lang="en-GB" dirty="0"/>
               <a:t>Update the reading guide</a:t>
             </a:r>
-            <a:endParaRPr lang="en-GB" dirty="0"/>
           </a:p>
           <a:p>
             <a:r>
@@ -3814,6 +3828,14 @@
             </a:r>
           </a:p>
           <a:p>
+            <a:r>
+              <a:rPr lang="en-GB" dirty="0"/>
+              <a:t>Orchestrated with </a:t>
+            </a:r>
+            <a:r>
+              <a:rPr lang="en-GB" dirty="0" err="1"/>
+              <a:t>kubernetes</a:t>
+            </a:r>
             <a:endParaRPr lang="en-GB" dirty="0"/>
           </a:p>
         </p:txBody>
@@ -3912,7 +3934,7 @@
           <a:p>
             <a:r>
               <a:rPr lang="en-GB" dirty="0"/>
-              <a:t>Finish authentication &amp; authorization</a:t>
+              <a:t>Work authentication &amp; authorization after risk analysis</a:t>
             </a:r>
           </a:p>
           <a:p>
@@ -3927,6 +3949,12 @@
             <a:r>
               <a:rPr lang="en-GB" dirty="0"/>
               <a:t> testing</a:t>
+            </a:r>
+          </a:p>
+          <a:p>
+            <a:r>
+              <a:rPr lang="en-GB" dirty="0"/>
+              <a:t>Direct-service communication</a:t>
             </a:r>
           </a:p>
           <a:p>

</xml_diff>